<commit_message>
fixed regarding security requirement
</commit_message>
<xml_diff>
--- a/presentation/要件定義書.pptx
+++ b/presentation/要件定義書.pptx
@@ -6620,39 +6620,6 @@
             <a:r>
               <a:rPr lang="ja-JP" altLang="en-US" sz="1400"/>
               <a:t>スタンドアロン</a:t>
-            </a:r>
-            <a:r>
-              <a:rPr lang="en-US" altLang="ja-JP" sz="1400" dirty="0"/>
-              <a:t>)</a:t>
-            </a:r>
-            <a:br>
-              <a:rPr lang="en-US" altLang="ja-JP" sz="1400" dirty="0"/>
-            </a:br>
-            <a:br>
-              <a:rPr lang="en-US" altLang="ja-JP" sz="1400" dirty="0"/>
-            </a:br>
-            <a:r>
-              <a:rPr lang="ja-JP" altLang="en-US" sz="1400"/>
-              <a:t>・予測処理の開始から結果の出力までのターンアラウンドタイムは</a:t>
-            </a:r>
-            <a:r>
-              <a:rPr lang="en-US" altLang="ja-JP" sz="1400" dirty="0"/>
-              <a:t>10</a:t>
-            </a:r>
-            <a:r>
-              <a:rPr lang="ja-JP" altLang="en-US" sz="1400"/>
-              <a:t>秒以内</a:t>
-            </a:r>
-            <a:br>
-              <a:rPr lang="en-US" altLang="ja-JP" sz="1400" dirty="0"/>
-            </a:br>
-            <a:r>
-              <a:rPr lang="en-US" altLang="ja-JP" sz="1400" dirty="0"/>
-              <a:t>  (</a:t>
-            </a:r>
-            <a:r>
-              <a:rPr lang="ja-JP" altLang="en-US" sz="1400"/>
-              <a:t>ただし、計測は開発機のスペックを基準とする</a:t>
             </a:r>
             <a:r>
               <a:rPr lang="en-US" altLang="ja-JP" sz="1400" dirty="0"/>

</xml_diff>